<commit_message>
TRFs after aud shifting
</commit_message>
<xml_diff>
--- a/eelbrain_TRFs.pptx
+++ b/eelbrain_TRFs.pptx
@@ -24,7 +24,7 @@
     <p:sldId id="273" r:id="rId18"/>
     <p:sldId id="274" r:id="rId19"/>
     <p:sldId id="275" r:id="rId20"/>
-    <p:sldId id="271" r:id="rId21"/>
+    <p:sldId id="278" r:id="rId21"/>
   </p:sldIdLst>
   <p:sldSz cx="12192000" cy="6858000"/>
   <p:notesSz cx="6858000" cy="9144000"/>
@@ -294,7 +294,7 @@
           <a:p>
             <a:fld id="{403CB87E-4591-47A1-9046-CF63F17215EF}" type="datetime2">
               <a:rPr lang="en-US" smtClean="0"/>
-              <a:t>Tuesday, June 7, 2022</a:t>
+              <a:t>Wednesday, June 15, 2022</a:t>
             </a:fld>
             <a:endParaRPr lang="en-US" dirty="0"/>
           </a:p>
@@ -516,7 +516,7 @@
           <a:p>
             <a:fld id="{2FA17F0E-8070-4DFE-A821-9A699EDBAD7E}" type="datetime2">
               <a:rPr lang="en-US" smtClean="0"/>
-              <a:t>Tuesday, June 7, 2022</a:t>
+              <a:t>Wednesday, June 15, 2022</a:t>
             </a:fld>
             <a:endParaRPr lang="en-US"/>
           </a:p>
@@ -728,7 +728,7 @@
           <a:p>
             <a:fld id="{D88D34AE-C7BF-46E5-A968-01C6641F6476}" type="datetime2">
               <a:rPr lang="en-US" smtClean="0"/>
-              <a:t>Tuesday, June 7, 2022</a:t>
+              <a:t>Wednesday, June 15, 2022</a:t>
             </a:fld>
             <a:endParaRPr lang="en-US"/>
           </a:p>
@@ -969,7 +969,7 @@
           <a:p>
             <a:fld id="{F33DE70B-B772-416E-A790-995760B1742E}" type="datetime2">
               <a:rPr lang="en-US" smtClean="0"/>
-              <a:t>Tuesday, June 7, 2022</a:t>
+              <a:t>Wednesday, June 15, 2022</a:t>
             </a:fld>
             <a:endParaRPr lang="en-US" dirty="0"/>
           </a:p>
@@ -1268,7 +1268,7 @@
           <a:p>
             <a:fld id="{76760CDE-A6F1-4138-AF12-ED09E8E5FB6B}" type="datetime2">
               <a:rPr lang="en-US" smtClean="0"/>
-              <a:t>Tuesday, June 7, 2022</a:t>
+              <a:t>Wednesday, June 15, 2022</a:t>
             </a:fld>
             <a:endParaRPr lang="en-US"/>
           </a:p>
@@ -1600,7 +1600,7 @@
           <a:p>
             <a:fld id="{DB15F8B1-DB7B-4D28-A97D-40FB2DD1EF78}" type="datetime2">
               <a:rPr lang="en-US" smtClean="0"/>
-              <a:t>Tuesday, June 7, 2022</a:t>
+              <a:t>Wednesday, June 15, 2022</a:t>
             </a:fld>
             <a:endParaRPr lang="en-US"/>
           </a:p>
@@ -2046,7 +2046,7 @@
           <a:p>
             <a:fld id="{14039161-23B8-4738-9069-73EBE8884FDD}" type="datetime2">
               <a:rPr lang="en-US" smtClean="0"/>
-              <a:t>Tuesday, June 7, 2022</a:t>
+              <a:t>Wednesday, June 15, 2022</a:t>
             </a:fld>
             <a:endParaRPr lang="en-US"/>
           </a:p>
@@ -2202,7 +2202,7 @@
           <a:p>
             <a:fld id="{FA994D44-7693-499F-AC6C-11696134FE3F}" type="datetime2">
               <a:rPr lang="en-US" smtClean="0"/>
-              <a:t>Tuesday, June 7, 2022</a:t>
+              <a:t>Wednesday, June 15, 2022</a:t>
             </a:fld>
             <a:endParaRPr lang="en-US"/>
           </a:p>
@@ -2319,7 +2319,7 @@
           <a:p>
             <a:fld id="{363AF2AE-472C-4EF3-ABB2-24BAA9AE3CF7}" type="datetime2">
               <a:rPr lang="en-US" smtClean="0"/>
-              <a:t>Tuesday, June 7, 2022</a:t>
+              <a:t>Wednesday, June 15, 2022</a:t>
             </a:fld>
             <a:endParaRPr lang="en-US"/>
           </a:p>
@@ -2646,7 +2646,7 @@
           <a:p>
             <a:fld id="{EAEA162C-A7C1-4263-9453-1BAFF8C39559}" type="datetime2">
               <a:rPr lang="en-US" smtClean="0"/>
-              <a:t>Tuesday, June 7, 2022</a:t>
+              <a:t>Wednesday, June 15, 2022</a:t>
             </a:fld>
             <a:endParaRPr lang="en-US"/>
           </a:p>
@@ -2952,7 +2952,7 @@
           <a:p>
             <a:fld id="{64DF6793-3458-4587-8168-65F0C37A92D2}" type="datetime2">
               <a:rPr lang="en-US" smtClean="0"/>
-              <a:t>Tuesday, June 7, 2022</a:t>
+              <a:t>Wednesday, June 15, 2022</a:t>
             </a:fld>
             <a:endParaRPr lang="en-US"/>
           </a:p>
@@ -3305,7 +3305,7 @@
             <a:fld id="{E8352ED3-3C46-4C9A-9738-67B2D875E7E2}" type="datetime2">
               <a:rPr lang="en-US" smtClean="0"/>
               <a:pPr/>
-              <a:t>Tuesday, June 7, 2022</a:t>
+              <a:t>Wednesday, June 15, 2022</a:t>
             </a:fld>
             <a:endParaRPr lang="en-US" dirty="0"/>
           </a:p>
@@ -7815,7 +7815,7 @@
         </p:blipFill>
         <p:spPr bwMode="auto">
           <a:xfrm>
-            <a:off x="9111945" y="4208860"/>
+            <a:off x="8614172" y="4186882"/>
             <a:ext cx="3543300" cy="2362200"/>
           </a:xfrm>
           <a:prstGeom prst="rect">
@@ -8528,7 +8528,7 @@
           <p:cNvPr id="2" name="Title 1">
             <a:extLst>
               <a:ext uri="{FF2B5EF4-FFF2-40B4-BE49-F238E27FC236}">
-                <a16:creationId xmlns:a16="http://schemas.microsoft.com/office/drawing/2014/main" id="{4028258A-820B-A538-BF5A-873E2E7E77FC}"/>
+                <a16:creationId xmlns:a16="http://schemas.microsoft.com/office/drawing/2014/main" id="{4BE038F7-1A6D-012C-4A64-0DD7BFAE73E9}"/>
               </a:ext>
             </a:extLst>
           </p:cNvPr>
@@ -8539,14 +8539,21 @@
             <p:ph type="title"/>
           </p:nvPr>
         </p:nvSpPr>
-        <p:spPr/>
-        <p:txBody>
-          <a:bodyPr/>
+        <p:spPr>
+          <a:xfrm>
+            <a:off x="420624" y="365125"/>
+            <a:ext cx="10543032" cy="752475"/>
+          </a:xfrm>
+        </p:spPr>
+        <p:txBody>
+          <a:bodyPr>
+            <a:normAutofit fontScale="90000"/>
+          </a:bodyPr>
           <a:lstStyle/>
           <a:p>
             <a:r>
               <a:rPr lang="en-US" altLang="ko-KR"/>
-              <a:t>R0462: before/after shifting</a:t>
+              <a:t>After shifting</a:t>
             </a:r>
             <a:endParaRPr lang="ko-KR" altLang="en-US"/>
           </a:p>
@@ -8554,10 +8561,10 @@
       </p:sp>
       <p:pic>
         <p:nvPicPr>
-          <p:cNvPr id="4" name="Picture 2">
-            <a:extLst>
-              <a:ext uri="{FF2B5EF4-FFF2-40B4-BE49-F238E27FC236}">
-                <a16:creationId xmlns:a16="http://schemas.microsoft.com/office/drawing/2014/main" id="{6D5C875F-2ECF-326D-AB86-F51E08EE4C8C}"/>
+          <p:cNvPr id="1026" name="Picture 2">
+            <a:extLst>
+              <a:ext uri="{FF2B5EF4-FFF2-40B4-BE49-F238E27FC236}">
+                <a16:creationId xmlns:a16="http://schemas.microsoft.com/office/drawing/2014/main" id="{E9D560B9-92DC-FE79-A137-B7B84F5B6DE4}"/>
               </a:ext>
             </a:extLst>
           </p:cNvPr>
@@ -8581,8 +8588,8 @@
         </p:blipFill>
         <p:spPr bwMode="auto">
           <a:xfrm>
-            <a:off x="1228344" y="4499811"/>
-            <a:ext cx="7872450" cy="2358189"/>
+            <a:off x="2175230" y="1256968"/>
+            <a:ext cx="7250993" cy="2172032"/>
           </a:xfrm>
           <a:prstGeom prst="rect">
             <a:avLst/>
@@ -8599,12 +8606,48 @@
           </a:extLst>
         </p:spPr>
       </p:pic>
+      <p:sp>
+        <p:nvSpPr>
+          <p:cNvPr id="4" name="TextBox 3">
+            <a:extLst>
+              <a:ext uri="{FF2B5EF4-FFF2-40B4-BE49-F238E27FC236}">
+                <a16:creationId xmlns:a16="http://schemas.microsoft.com/office/drawing/2014/main" id="{7D169319-9581-A7FF-7DEA-E99F3B30E24F}"/>
+              </a:ext>
+            </a:extLst>
+          </p:cNvPr>
+          <p:cNvSpPr txBox="1"/>
+          <p:nvPr/>
+        </p:nvSpPr>
+        <p:spPr>
+          <a:xfrm>
+            <a:off x="993422" y="1456267"/>
+            <a:ext cx="851515" cy="369332"/>
+          </a:xfrm>
+          <a:prstGeom prst="rect">
+            <a:avLst/>
+          </a:prstGeom>
+          <a:noFill/>
+        </p:spPr>
+        <p:txBody>
+          <a:bodyPr wrap="none" rtlCol="0">
+            <a:spAutoFit/>
+          </a:bodyPr>
+          <a:lstStyle/>
+          <a:p>
+            <a:r>
+              <a:rPr lang="en-US" altLang="ko-KR"/>
+              <a:t>R0443</a:t>
+            </a:r>
+            <a:endParaRPr lang="ko-KR" altLang="en-US"/>
+          </a:p>
+        </p:txBody>
+      </p:sp>
       <p:pic>
         <p:nvPicPr>
-          <p:cNvPr id="5" name="Picture 18">
-            <a:extLst>
-              <a:ext uri="{FF2B5EF4-FFF2-40B4-BE49-F238E27FC236}">
-                <a16:creationId xmlns:a16="http://schemas.microsoft.com/office/drawing/2014/main" id="{DE1DC3CA-63A0-64A9-0069-146B2986D4D4}"/>
+          <p:cNvPr id="1028" name="Picture 4">
+            <a:extLst>
+              <a:ext uri="{FF2B5EF4-FFF2-40B4-BE49-F238E27FC236}">
+                <a16:creationId xmlns:a16="http://schemas.microsoft.com/office/drawing/2014/main" id="{7E684370-400E-A891-3CF8-000D847A63E7}"/>
               </a:ext>
             </a:extLst>
           </p:cNvPr>
@@ -8628,8 +8671,8 @@
         </p:blipFill>
         <p:spPr bwMode="auto">
           <a:xfrm>
-            <a:off x="1228344" y="1985211"/>
-            <a:ext cx="7872450" cy="2358189"/>
+            <a:off x="2175229" y="3122967"/>
+            <a:ext cx="7250994" cy="2172032"/>
           </a:xfrm>
           <a:prstGeom prst="rect">
             <a:avLst/>
@@ -8646,10 +8689,129 @@
           </a:extLst>
         </p:spPr>
       </p:pic>
+      <p:sp>
+        <p:nvSpPr>
+          <p:cNvPr id="7" name="TextBox 6">
+            <a:extLst>
+              <a:ext uri="{FF2B5EF4-FFF2-40B4-BE49-F238E27FC236}">
+                <a16:creationId xmlns:a16="http://schemas.microsoft.com/office/drawing/2014/main" id="{0FDF4209-B04B-FE74-33A7-5433DC2D3509}"/>
+              </a:ext>
+            </a:extLst>
+          </p:cNvPr>
+          <p:cNvSpPr txBox="1"/>
+          <p:nvPr/>
+        </p:nvSpPr>
+        <p:spPr>
+          <a:xfrm>
+            <a:off x="993422" y="3244334"/>
+            <a:ext cx="851515" cy="369332"/>
+          </a:xfrm>
+          <a:prstGeom prst="rect">
+            <a:avLst/>
+          </a:prstGeom>
+          <a:noFill/>
+        </p:spPr>
+        <p:txBody>
+          <a:bodyPr wrap="none" rtlCol="0">
+            <a:spAutoFit/>
+          </a:bodyPr>
+          <a:lstStyle/>
+          <a:p>
+            <a:r>
+              <a:rPr lang="en-US" altLang="ko-KR"/>
+              <a:t>R0459</a:t>
+            </a:r>
+            <a:endParaRPr lang="ko-KR" altLang="en-US"/>
+          </a:p>
+        </p:txBody>
+      </p:sp>
+      <p:pic>
+        <p:nvPicPr>
+          <p:cNvPr id="1030" name="Picture 6">
+            <a:extLst>
+              <a:ext uri="{FF2B5EF4-FFF2-40B4-BE49-F238E27FC236}">
+                <a16:creationId xmlns:a16="http://schemas.microsoft.com/office/drawing/2014/main" id="{3297BF0E-C180-8C68-8858-D044E0C6026C}"/>
+              </a:ext>
+            </a:extLst>
+          </p:cNvPr>
+          <p:cNvPicPr>
+            <a:picLocks noChangeAspect="1" noChangeArrowheads="1"/>
+          </p:cNvPicPr>
+          <p:nvPr/>
+        </p:nvPicPr>
+        <p:blipFill>
+          <a:blip r:embed="rId4">
+            <a:extLst>
+              <a:ext uri="{28A0092B-C50C-407E-A947-70E740481C1C}">
+                <a14:useLocalDpi xmlns:a14="http://schemas.microsoft.com/office/drawing/2010/main" val="0"/>
+              </a:ext>
+            </a:extLst>
+          </a:blip>
+          <a:srcRect/>
+          <a:stretch>
+            <a:fillRect/>
+          </a:stretch>
+        </p:blipFill>
+        <p:spPr bwMode="auto">
+          <a:xfrm>
+            <a:off x="2175228" y="4967619"/>
+            <a:ext cx="7322258" cy="2193379"/>
+          </a:xfrm>
+          <a:prstGeom prst="rect">
+            <a:avLst/>
+          </a:prstGeom>
+          <a:noFill/>
+          <a:extLst>
+            <a:ext uri="{909E8E84-426E-40DD-AFC4-6F175D3DCCD1}">
+              <a14:hiddenFill xmlns:a14="http://schemas.microsoft.com/office/drawing/2010/main">
+                <a:solidFill>
+                  <a:srgbClr val="FFFFFF"/>
+                </a:solidFill>
+              </a14:hiddenFill>
+            </a:ext>
+          </a:extLst>
+        </p:spPr>
+      </p:pic>
+      <p:sp>
+        <p:nvSpPr>
+          <p:cNvPr id="9" name="TextBox 8">
+            <a:extLst>
+              <a:ext uri="{FF2B5EF4-FFF2-40B4-BE49-F238E27FC236}">
+                <a16:creationId xmlns:a16="http://schemas.microsoft.com/office/drawing/2014/main" id="{B9A369E1-B52B-00C3-E0AF-3CCD6A7CF048}"/>
+              </a:ext>
+            </a:extLst>
+          </p:cNvPr>
+          <p:cNvSpPr txBox="1"/>
+          <p:nvPr/>
+        </p:nvSpPr>
+        <p:spPr>
+          <a:xfrm>
+            <a:off x="993421" y="5110333"/>
+            <a:ext cx="851515" cy="369332"/>
+          </a:xfrm>
+          <a:prstGeom prst="rect">
+            <a:avLst/>
+          </a:prstGeom>
+          <a:noFill/>
+        </p:spPr>
+        <p:txBody>
+          <a:bodyPr wrap="none" rtlCol="0">
+            <a:spAutoFit/>
+          </a:bodyPr>
+          <a:lstStyle/>
+          <a:p>
+            <a:r>
+              <a:rPr lang="en-US" altLang="ko-KR"/>
+              <a:t>R0462</a:t>
+            </a:r>
+            <a:endParaRPr lang="ko-KR" altLang="en-US"/>
+          </a:p>
+        </p:txBody>
+      </p:sp>
     </p:spTree>
     <p:extLst>
       <p:ext uri="{BB962C8B-B14F-4D97-AF65-F5344CB8AC3E}">
-        <p14:creationId xmlns:p14="http://schemas.microsoft.com/office/powerpoint/2010/main" val="3587539396"/>
+        <p14:creationId xmlns:p14="http://schemas.microsoft.com/office/powerpoint/2010/main" val="3851944100"/>
       </p:ext>
     </p:extLst>
   </p:cSld>

</xml_diff>